<commit_message>
updated parking pass expiry date
</commit_message>
<xml_diff>
--- a/parking-pass.pptx
+++ b/parking-pass.pptx
@@ -212,7 +212,7 @@
           <a:p>
             <a:fld id="{B9885196-91AC-474B-9CEB-56F8EDAD53EB}" type="datetimeFigureOut">
               <a:rPr lang="en-US" smtClean="0"/>
-              <a:t>8/20/2018</a:t>
+              <a:t>9/6/2018</a:t>
             </a:fld>
             <a:endParaRPr lang="en-US"/>
           </a:p>
@@ -699,7 +699,7 @@
           <a:p>
             <a:fld id="{1FDD7528-FECD-40E9-8848-8AC3F286F2C5}" type="datetimeFigureOut">
               <a:rPr lang="en-US" smtClean="0"/>
-              <a:t>8/20/2018</a:t>
+              <a:t>9/6/2018</a:t>
             </a:fld>
             <a:endParaRPr lang="en-US"/>
           </a:p>
@@ -869,7 +869,7 @@
           <a:p>
             <a:fld id="{1FDD7528-FECD-40E9-8848-8AC3F286F2C5}" type="datetimeFigureOut">
               <a:rPr lang="en-US" smtClean="0"/>
-              <a:t>8/20/2018</a:t>
+              <a:t>9/6/2018</a:t>
             </a:fld>
             <a:endParaRPr lang="en-US"/>
           </a:p>
@@ -1049,7 +1049,7 @@
           <a:p>
             <a:fld id="{1FDD7528-FECD-40E9-8848-8AC3F286F2C5}" type="datetimeFigureOut">
               <a:rPr lang="en-US" smtClean="0"/>
-              <a:t>8/20/2018</a:t>
+              <a:t>9/6/2018</a:t>
             </a:fld>
             <a:endParaRPr lang="en-US"/>
           </a:p>
@@ -1219,7 +1219,7 @@
           <a:p>
             <a:fld id="{1FDD7528-FECD-40E9-8848-8AC3F286F2C5}" type="datetimeFigureOut">
               <a:rPr lang="en-US" smtClean="0"/>
-              <a:t>8/20/2018</a:t>
+              <a:t>9/6/2018</a:t>
             </a:fld>
             <a:endParaRPr lang="en-US"/>
           </a:p>
@@ -1463,7 +1463,7 @@
           <a:p>
             <a:fld id="{1FDD7528-FECD-40E9-8848-8AC3F286F2C5}" type="datetimeFigureOut">
               <a:rPr lang="en-US" smtClean="0"/>
-              <a:t>8/20/2018</a:t>
+              <a:t>9/6/2018</a:t>
             </a:fld>
             <a:endParaRPr lang="en-US"/>
           </a:p>
@@ -1695,7 +1695,7 @@
           <a:p>
             <a:fld id="{1FDD7528-FECD-40E9-8848-8AC3F286F2C5}" type="datetimeFigureOut">
               <a:rPr lang="en-US" smtClean="0"/>
-              <a:t>8/20/2018</a:t>
+              <a:t>9/6/2018</a:t>
             </a:fld>
             <a:endParaRPr lang="en-US"/>
           </a:p>
@@ -2062,7 +2062,7 @@
           <a:p>
             <a:fld id="{1FDD7528-FECD-40E9-8848-8AC3F286F2C5}" type="datetimeFigureOut">
               <a:rPr lang="en-US" smtClean="0"/>
-              <a:t>8/20/2018</a:t>
+              <a:t>9/6/2018</a:t>
             </a:fld>
             <a:endParaRPr lang="en-US"/>
           </a:p>
@@ -2180,7 +2180,7 @@
           <a:p>
             <a:fld id="{1FDD7528-FECD-40E9-8848-8AC3F286F2C5}" type="datetimeFigureOut">
               <a:rPr lang="en-US" smtClean="0"/>
-              <a:t>8/20/2018</a:t>
+              <a:t>9/6/2018</a:t>
             </a:fld>
             <a:endParaRPr lang="en-US"/>
           </a:p>
@@ -2275,7 +2275,7 @@
           <a:p>
             <a:fld id="{1FDD7528-FECD-40E9-8848-8AC3F286F2C5}" type="datetimeFigureOut">
               <a:rPr lang="en-US" smtClean="0"/>
-              <a:t>8/20/2018</a:t>
+              <a:t>9/6/2018</a:t>
             </a:fld>
             <a:endParaRPr lang="en-US"/>
           </a:p>
@@ -2552,7 +2552,7 @@
           <a:p>
             <a:fld id="{1FDD7528-FECD-40E9-8848-8AC3F286F2C5}" type="datetimeFigureOut">
               <a:rPr lang="en-US" smtClean="0"/>
-              <a:t>8/20/2018</a:t>
+              <a:t>9/6/2018</a:t>
             </a:fld>
             <a:endParaRPr lang="en-US"/>
           </a:p>
@@ -2809,7 +2809,7 @@
           <a:p>
             <a:fld id="{1FDD7528-FECD-40E9-8848-8AC3F286F2C5}" type="datetimeFigureOut">
               <a:rPr lang="en-US" smtClean="0"/>
-              <a:t>8/20/2018</a:t>
+              <a:t>9/6/2018</a:t>
             </a:fld>
             <a:endParaRPr lang="en-US"/>
           </a:p>
@@ -3022,7 +3022,7 @@
           <a:p>
             <a:fld id="{1FDD7528-FECD-40E9-8848-8AC3F286F2C5}" type="datetimeFigureOut">
               <a:rPr lang="en-US" smtClean="0"/>
-              <a:t>8/20/2018</a:t>
+              <a:t>9/6/2018</a:t>
             </a:fld>
             <a:endParaRPr lang="en-US"/>
           </a:p>
@@ -3593,7 +3593,7 @@
                 </a:solidFill>
                 <a:latin typeface="Berlin Sans FB" panose="020E0602020502020306" pitchFamily="34" charset="0"/>
               </a:rPr>
-              <a:t>Valid August 1 – August 31, 2018</a:t>
+              <a:t>Valid September 1 – September 30, 2018</a:t>
             </a:r>
           </a:p>
           <a:p>
@@ -3835,31 +3835,7 @@
                 </a:solidFill>
                 <a:latin typeface="Berlin Sans FB" panose="020E0602020502020306" pitchFamily="34" charset="0"/>
               </a:rPr>
-              <a:t>Valid August 1 </a:t>
-            </a:r>
-            <a:r>
-              <a:rPr lang="en-US" sz="1400">
-                <a:solidFill>
-                  <a:schemeClr val="tx1">
-                    <a:lumMod val="75000"/>
-                    <a:lumOff val="25000"/>
-                  </a:schemeClr>
-                </a:solidFill>
-                <a:latin typeface="Berlin Sans FB" panose="020E0602020502020306" pitchFamily="34" charset="0"/>
-              </a:rPr>
-              <a:t>– August 31, </a:t>
-            </a:r>
-            <a:r>
-              <a:rPr lang="en-US" sz="1400" dirty="0">
-                <a:solidFill>
-                  <a:schemeClr val="tx1">
-                    <a:lumMod val="75000"/>
-                    <a:lumOff val="25000"/>
-                  </a:schemeClr>
-                </a:solidFill>
-                <a:latin typeface="Berlin Sans FB" panose="020E0602020502020306" pitchFamily="34" charset="0"/>
-              </a:rPr>
-              <a:t>2018</a:t>
+              <a:t>Valid September 1 – September 30, 2018</a:t>
             </a:r>
           </a:p>
           <a:p>

</xml_diff>